<commit_message>
genecounter.py code seems to place gains and losses on correct branches, and count up gene numbers properly, but still needs proper testing
</commit_message>
<xml_diff>
--- a/talk.pptx
+++ b/talk.pptx
@@ -15,6 +15,7 @@
     <p:sldId id="263" r:id="rId9"/>
     <p:sldId id="264" r:id="rId10"/>
     <p:sldId id="265" r:id="rId11"/>
+    <p:sldId id="266" r:id="rId12"/>
   </p:sldIdLst>
   <p:sldSz cx="9144000" cy="6858000" type="screen4x3"/>
   <p:notesSz cx="6858000" cy="9144000"/>
@@ -3114,9 +3115,16 @@
             <p:ph type="ctrTitle"/>
           </p:nvPr>
         </p:nvSpPr>
-        <p:spPr/>
-        <p:txBody>
-          <a:bodyPr/>
+        <p:spPr>
+          <a:xfrm>
+            <a:off x="685800" y="1270105"/>
+            <a:ext cx="7772400" cy="2330345"/>
+          </a:xfrm>
+        </p:spPr>
+        <p:txBody>
+          <a:bodyPr>
+            <a:normAutofit fontScale="90000"/>
+          </a:bodyPr>
           <a:lstStyle/>
           <a:p>
             <a:r>
@@ -3139,7 +3147,21 @@
               <a:rPr lang="en-US" dirty="0" smtClean="0"/>
               <a:t> trees</a:t>
             </a:r>
-            <a:endParaRPr lang="en-US" dirty="0"/>
+            <a:br>
+              <a:rPr lang="en-US" dirty="0" smtClean="0"/>
+            </a:br>
+            <a:r>
+              <a:rPr lang="en-US" dirty="0" smtClean="0"/>
+              <a:t/>
+            </a:r>
+            <a:br>
+              <a:rPr lang="en-US" dirty="0" smtClean="0"/>
+            </a:br>
+            <a:r>
+              <a:rPr lang="en-US" sz="3600" dirty="0" smtClean="0"/>
+              <a:t>Kevin Gori</a:t>
+            </a:r>
+            <a:endParaRPr lang="en-US" sz="3600" dirty="0"/>
           </a:p>
         </p:txBody>
       </p:sp>
@@ -3192,6 +3214,13 @@
   <p:clrMapOvr>
     <a:masterClrMapping/>
   </p:clrMapOvr>
+  <p:timing>
+    <p:tnLst>
+      <p:par>
+        <p:cTn xmlns:p14="http://schemas.microsoft.com/office/powerpoint/2010/main" id="1" dur="indefinite" restart="never" nodeType="tmRoot"/>
+      </p:par>
+    </p:tnLst>
+  </p:timing>
 </p:sld>
 </file>
 
@@ -3268,6 +3297,125 @@
   <p:clrMapOvr>
     <a:masterClrMapping/>
   </p:clrMapOvr>
+  <p:timing>
+    <p:tnLst>
+      <p:par>
+        <p:cTn xmlns:p14="http://schemas.microsoft.com/office/powerpoint/2010/main" id="1" dur="indefinite" restart="never" nodeType="tmRoot"/>
+      </p:par>
+    </p:tnLst>
+  </p:timing>
+</p:sld>
+</file>
+
+<file path=ppt/slides/slide11.xml><?xml version="1.0" encoding="utf-8"?>
+<p:sld xmlns:a="http://schemas.openxmlformats.org/drawingml/2006/main" xmlns:r="http://schemas.openxmlformats.org/officeDocument/2006/relationships" xmlns:p="http://schemas.openxmlformats.org/presentationml/2006/main">
+  <p:cSld>
+    <p:spTree>
+      <p:nvGrpSpPr>
+        <p:cNvPr id="1" name=""/>
+        <p:cNvGrpSpPr/>
+        <p:nvPr/>
+      </p:nvGrpSpPr>
+      <p:grpSpPr>
+        <a:xfrm>
+          <a:off x="0" y="0"/>
+          <a:ext cx="0" cy="0"/>
+          <a:chOff x="0" y="0"/>
+          <a:chExt cx="0" cy="0"/>
+        </a:xfrm>
+      </p:grpSpPr>
+      <p:sp>
+        <p:nvSpPr>
+          <p:cNvPr id="3" name="Content Placeholder 2"/>
+          <p:cNvSpPr>
+            <a:spLocks noGrp="1"/>
+          </p:cNvSpPr>
+          <p:nvPr>
+            <p:ph idx="1"/>
+          </p:nvPr>
+        </p:nvSpPr>
+        <p:spPr>
+          <a:xfrm>
+            <a:off x="457200" y="657734"/>
+            <a:ext cx="8229600" cy="5468430"/>
+          </a:xfrm>
+        </p:spPr>
+        <p:txBody>
+          <a:bodyPr/>
+          <a:lstStyle/>
+          <a:p>
+            <a:r>
+              <a:rPr lang="en-US" dirty="0" smtClean="0"/>
+              <a:t>Thanks to: </a:t>
+            </a:r>
+          </a:p>
+          <a:p>
+            <a:pPr lvl="1"/>
+            <a:r>
+              <a:rPr lang="en-US" dirty="0" smtClean="0"/>
+              <a:t>Goldman Group</a:t>
+            </a:r>
+          </a:p>
+          <a:p>
+            <a:pPr lvl="1"/>
+            <a:r>
+              <a:rPr lang="en-US" dirty="0" err="1" smtClean="0"/>
+              <a:t>Ensembl</a:t>
+            </a:r>
+            <a:r>
+              <a:rPr lang="en-US" dirty="0" smtClean="0"/>
+              <a:t> </a:t>
+            </a:r>
+            <a:r>
+              <a:rPr lang="en-US" dirty="0" err="1" smtClean="0"/>
+              <a:t>Compara</a:t>
+            </a:r>
+            <a:endParaRPr lang="en-US" dirty="0" smtClean="0"/>
+          </a:p>
+          <a:p>
+            <a:endParaRPr lang="en-US" dirty="0"/>
+          </a:p>
+          <a:p>
+            <a:r>
+              <a:rPr lang="en-US" dirty="0" smtClean="0"/>
+              <a:t>Code implemented in Python using ETE2</a:t>
+            </a:r>
+          </a:p>
+          <a:p>
+            <a:pPr lvl="1"/>
+            <a:r>
+              <a:rPr lang="en-US" dirty="0" err="1"/>
+              <a:t>git@github.com:kgori</a:t>
+            </a:r>
+            <a:r>
+              <a:rPr lang="en-US" dirty="0"/>
+              <a:t>/</a:t>
+            </a:r>
+            <a:r>
+              <a:rPr lang="en-US" dirty="0" err="1"/>
+              <a:t>ensembl_project.git</a:t>
+            </a:r>
+            <a:endParaRPr lang="en-US" dirty="0"/>
+          </a:p>
+        </p:txBody>
+      </p:sp>
+    </p:spTree>
+    <p:extLst>
+      <p:ext uri="{BB962C8B-B14F-4D97-AF65-F5344CB8AC3E}">
+        <p14:creationId xmlns:p14="http://schemas.microsoft.com/office/powerpoint/2010/main" val="580786274"/>
+      </p:ext>
+    </p:extLst>
+  </p:cSld>
+  <p:clrMapOvr>
+    <a:masterClrMapping/>
+  </p:clrMapOvr>
+  <p:timing>
+    <p:tnLst>
+      <p:par>
+        <p:cTn xmlns:p14="http://schemas.microsoft.com/office/powerpoint/2010/main" id="1" dur="indefinite" restart="never" nodeType="tmRoot"/>
+      </p:par>
+    </p:tnLst>
+  </p:timing>
 </p:sld>
 </file>
 
@@ -3300,12 +3448,18 @@
         </p:nvSpPr>
         <p:spPr/>
         <p:txBody>
-          <a:bodyPr/>
-          <a:lstStyle/>
-          <a:p>
+          <a:bodyPr>
+            <a:normAutofit fontScale="90000"/>
+          </a:bodyPr>
+          <a:lstStyle/>
+          <a:p>
+            <a:r>
+              <a:rPr lang="en-US" dirty="0" err="1" smtClean="0"/>
+              <a:t>Ensembl</a:t>
+            </a:r>
             <a:r>
               <a:rPr lang="en-US" dirty="0" smtClean="0"/>
-              <a:t>Reconciled gene-species trees</a:t>
+              <a:t> has reconciled gene-species trees</a:t>
             </a:r>
             <a:endParaRPr lang="en-US" dirty="0"/>
           </a:p>
@@ -3329,10 +3483,40 @@
         <p:spPr>
           <a:xfrm>
             <a:off x="895149" y="1417638"/>
-            <a:ext cx="6498590" cy="4620008"/>
+            <a:ext cx="5630037" cy="4002533"/>
           </a:xfrm>
         </p:spPr>
       </p:pic>
+      <p:sp>
+        <p:nvSpPr>
+          <p:cNvPr id="3" name="TextBox 2"/>
+          <p:cNvSpPr txBox="1"/>
+          <p:nvPr/>
+        </p:nvSpPr>
+        <p:spPr>
+          <a:xfrm>
+            <a:off x="895149" y="5597865"/>
+            <a:ext cx="5234419" cy="830997"/>
+          </a:xfrm>
+          <a:prstGeom prst="rect">
+            <a:avLst/>
+          </a:prstGeom>
+          <a:noFill/>
+        </p:spPr>
+        <p:txBody>
+          <a:bodyPr wrap="square" rtlCol="0">
+            <a:spAutoFit/>
+          </a:bodyPr>
+          <a:lstStyle/>
+          <a:p>
+            <a:r>
+              <a:rPr lang="en-US" sz="2400" dirty="0" smtClean="0"/>
+              <a:t>Can we use these to estimate gene gains and losses over the species tree?</a:t>
+            </a:r>
+            <a:endParaRPr lang="en-US" sz="2400" dirty="0"/>
+          </a:p>
+        </p:txBody>
+      </p:sp>
     </p:spTree>
     <p:extLst>
       <p:ext uri="{BB962C8B-B14F-4D97-AF65-F5344CB8AC3E}">
@@ -3343,6 +3527,84 @@
   <p:clrMapOvr>
     <a:masterClrMapping/>
   </p:clrMapOvr>
+  <p:timing>
+    <p:tnLst>
+      <p:par>
+        <p:cTn xmlns:p14="http://schemas.microsoft.com/office/powerpoint/2010/main" id="1" dur="indefinite" restart="never" nodeType="tmRoot">
+          <p:childTnLst>
+            <p:seq concurrent="1" nextAc="seek">
+              <p:cTn id="2" dur="indefinite" nodeType="mainSeq">
+                <p:childTnLst>
+                  <p:par>
+                    <p:cTn id="3" fill="hold">
+                      <p:stCondLst>
+                        <p:cond delay="indefinite"/>
+                      </p:stCondLst>
+                      <p:childTnLst>
+                        <p:par>
+                          <p:cTn id="4" fill="hold">
+                            <p:stCondLst>
+                              <p:cond delay="0"/>
+                            </p:stCondLst>
+                            <p:childTnLst>
+                              <p:par>
+                                <p:cTn id="5" presetID="1" presetClass="entr" presetSubtype="0" fill="hold" grpId="0" nodeType="clickEffect">
+                                  <p:stCondLst>
+                                    <p:cond delay="0"/>
+                                  </p:stCondLst>
+                                  <p:childTnLst>
+                                    <p:set>
+                                      <p:cBhvr>
+                                        <p:cTn id="6" dur="1" fill="hold">
+                                          <p:stCondLst>
+                                            <p:cond delay="0"/>
+                                          </p:stCondLst>
+                                        </p:cTn>
+                                        <p:tgtEl>
+                                          <p:spTgt spid="3"/>
+                                        </p:tgtEl>
+                                        <p:attrNameLst>
+                                          <p:attrName>style.visibility</p:attrName>
+                                        </p:attrNameLst>
+                                      </p:cBhvr>
+                                      <p:to>
+                                        <p:strVal val="visible"/>
+                                      </p:to>
+                                    </p:set>
+                                  </p:childTnLst>
+                                </p:cTn>
+                              </p:par>
+                            </p:childTnLst>
+                          </p:cTn>
+                        </p:par>
+                      </p:childTnLst>
+                    </p:cTn>
+                  </p:par>
+                </p:childTnLst>
+              </p:cTn>
+              <p:prevCondLst>
+                <p:cond evt="onPrev" delay="0">
+                  <p:tgtEl>
+                    <p:sldTgt/>
+                  </p:tgtEl>
+                </p:cond>
+              </p:prevCondLst>
+              <p:nextCondLst>
+                <p:cond evt="onNext" delay="0">
+                  <p:tgtEl>
+                    <p:sldTgt/>
+                  </p:tgtEl>
+                </p:cond>
+              </p:nextCondLst>
+            </p:seq>
+          </p:childTnLst>
+        </p:cTn>
+      </p:par>
+    </p:tnLst>
+    <p:bldLst>
+      <p:bldP spid="3" grpId="0"/>
+    </p:bldLst>
+  </p:timing>
 </p:sld>
 </file>
 
@@ -3420,6 +3682,13 @@
   <p:clrMapOvr>
     <a:masterClrMapping/>
   </p:clrMapOvr>
+  <p:timing>
+    <p:tnLst>
+      <p:par>
+        <p:cTn xmlns:p14="http://schemas.microsoft.com/office/powerpoint/2010/main" id="1" dur="indefinite" restart="never" nodeType="tmRoot"/>
+      </p:par>
+    </p:tnLst>
+  </p:timing>
 </p:sld>
 </file>
 
@@ -3497,6 +3766,13 @@
   <p:clrMapOvr>
     <a:masterClrMapping/>
   </p:clrMapOvr>
+  <p:timing>
+    <p:tnLst>
+      <p:par>
+        <p:cTn xmlns:p14="http://schemas.microsoft.com/office/powerpoint/2010/main" id="1" dur="indefinite" restart="never" nodeType="tmRoot"/>
+      </p:par>
+    </p:tnLst>
+  </p:timing>
 </p:sld>
 </file>
 
@@ -4001,6 +4277,426 @@
   <p:clrMapOvr>
     <a:masterClrMapping/>
   </p:clrMapOvr>
+  <p:timing>
+    <p:tnLst>
+      <p:par>
+        <p:cTn xmlns:p14="http://schemas.microsoft.com/office/powerpoint/2010/main" id="1" dur="indefinite" restart="never" nodeType="tmRoot">
+          <p:childTnLst>
+            <p:seq concurrent="1" nextAc="seek">
+              <p:cTn id="2" dur="indefinite" nodeType="mainSeq">
+                <p:childTnLst>
+                  <p:par>
+                    <p:cTn id="3" fill="hold">
+                      <p:stCondLst>
+                        <p:cond delay="indefinite"/>
+                      </p:stCondLst>
+                      <p:childTnLst>
+                        <p:par>
+                          <p:cTn id="4" fill="hold">
+                            <p:stCondLst>
+                              <p:cond delay="0"/>
+                            </p:stCondLst>
+                            <p:childTnLst>
+                              <p:par>
+                                <p:cTn id="5" presetID="1" presetClass="entr" presetSubtype="0" fill="hold" grpId="0" nodeType="clickEffect">
+                                  <p:stCondLst>
+                                    <p:cond delay="0"/>
+                                  </p:stCondLst>
+                                  <p:childTnLst>
+                                    <p:set>
+                                      <p:cBhvr>
+                                        <p:cTn id="6" dur="1" fill="hold">
+                                          <p:stCondLst>
+                                            <p:cond delay="0"/>
+                                          </p:stCondLst>
+                                        </p:cTn>
+                                        <p:tgtEl>
+                                          <p:spTgt spid="10"/>
+                                        </p:tgtEl>
+                                        <p:attrNameLst>
+                                          <p:attrName>style.visibility</p:attrName>
+                                        </p:attrNameLst>
+                                      </p:cBhvr>
+                                      <p:to>
+                                        <p:strVal val="visible"/>
+                                      </p:to>
+                                    </p:set>
+                                  </p:childTnLst>
+                                </p:cTn>
+                              </p:par>
+                              <p:par>
+                                <p:cTn id="7" presetID="1" presetClass="entr" presetSubtype="0" fill="hold" grpId="0" nodeType="withEffect">
+                                  <p:stCondLst>
+                                    <p:cond delay="0"/>
+                                  </p:stCondLst>
+                                  <p:childTnLst>
+                                    <p:set>
+                                      <p:cBhvr>
+                                        <p:cTn id="8" dur="1" fill="hold">
+                                          <p:stCondLst>
+                                            <p:cond delay="0"/>
+                                          </p:stCondLst>
+                                        </p:cTn>
+                                        <p:tgtEl>
+                                          <p:spTgt spid="12"/>
+                                        </p:tgtEl>
+                                        <p:attrNameLst>
+                                          <p:attrName>style.visibility</p:attrName>
+                                        </p:attrNameLst>
+                                      </p:cBhvr>
+                                      <p:to>
+                                        <p:strVal val="visible"/>
+                                      </p:to>
+                                    </p:set>
+                                  </p:childTnLst>
+                                </p:cTn>
+                              </p:par>
+                              <p:par>
+                                <p:cTn id="9" presetID="1" presetClass="entr" presetSubtype="0" fill="hold" grpId="0" nodeType="withEffect">
+                                  <p:stCondLst>
+                                    <p:cond delay="0"/>
+                                  </p:stCondLst>
+                                  <p:childTnLst>
+                                    <p:set>
+                                      <p:cBhvr>
+                                        <p:cTn id="10" dur="1" fill="hold">
+                                          <p:stCondLst>
+                                            <p:cond delay="0"/>
+                                          </p:stCondLst>
+                                        </p:cTn>
+                                        <p:tgtEl>
+                                          <p:spTgt spid="9"/>
+                                        </p:tgtEl>
+                                        <p:attrNameLst>
+                                          <p:attrName>style.visibility</p:attrName>
+                                        </p:attrNameLst>
+                                      </p:cBhvr>
+                                      <p:to>
+                                        <p:strVal val="visible"/>
+                                      </p:to>
+                                    </p:set>
+                                  </p:childTnLst>
+                                </p:cTn>
+                              </p:par>
+                            </p:childTnLst>
+                          </p:cTn>
+                        </p:par>
+                      </p:childTnLst>
+                    </p:cTn>
+                  </p:par>
+                  <p:par>
+                    <p:cTn id="11" fill="hold">
+                      <p:stCondLst>
+                        <p:cond delay="indefinite"/>
+                      </p:stCondLst>
+                      <p:childTnLst>
+                        <p:par>
+                          <p:cTn id="12" fill="hold">
+                            <p:stCondLst>
+                              <p:cond delay="0"/>
+                            </p:stCondLst>
+                            <p:childTnLst>
+                              <p:par>
+                                <p:cTn id="13" presetID="1" presetClass="entr" presetSubtype="0" fill="hold" grpId="0" nodeType="clickEffect">
+                                  <p:stCondLst>
+                                    <p:cond delay="0"/>
+                                  </p:stCondLst>
+                                  <p:childTnLst>
+                                    <p:set>
+                                      <p:cBhvr>
+                                        <p:cTn id="14" dur="1" fill="hold">
+                                          <p:stCondLst>
+                                            <p:cond delay="0"/>
+                                          </p:stCondLst>
+                                        </p:cTn>
+                                        <p:tgtEl>
+                                          <p:spTgt spid="11"/>
+                                        </p:tgtEl>
+                                        <p:attrNameLst>
+                                          <p:attrName>style.visibility</p:attrName>
+                                        </p:attrNameLst>
+                                      </p:cBhvr>
+                                      <p:to>
+                                        <p:strVal val="visible"/>
+                                      </p:to>
+                                    </p:set>
+                                  </p:childTnLst>
+                                </p:cTn>
+                              </p:par>
+                            </p:childTnLst>
+                          </p:cTn>
+                        </p:par>
+                      </p:childTnLst>
+                    </p:cTn>
+                  </p:par>
+                  <p:par>
+                    <p:cTn id="15" fill="hold">
+                      <p:stCondLst>
+                        <p:cond delay="indefinite"/>
+                      </p:stCondLst>
+                      <p:childTnLst>
+                        <p:par>
+                          <p:cTn id="16" fill="hold">
+                            <p:stCondLst>
+                              <p:cond delay="0"/>
+                            </p:stCondLst>
+                            <p:childTnLst>
+                              <p:par>
+                                <p:cTn id="17" presetID="1" presetClass="entr" presetSubtype="0" fill="hold" grpId="0" nodeType="clickEffect">
+                                  <p:stCondLst>
+                                    <p:cond delay="0"/>
+                                  </p:stCondLst>
+                                  <p:childTnLst>
+                                    <p:set>
+                                      <p:cBhvr>
+                                        <p:cTn id="18" dur="1" fill="hold">
+                                          <p:stCondLst>
+                                            <p:cond delay="0"/>
+                                          </p:stCondLst>
+                                        </p:cTn>
+                                        <p:tgtEl>
+                                          <p:spTgt spid="13"/>
+                                        </p:tgtEl>
+                                        <p:attrNameLst>
+                                          <p:attrName>style.visibility</p:attrName>
+                                        </p:attrNameLst>
+                                      </p:cBhvr>
+                                      <p:to>
+                                        <p:strVal val="visible"/>
+                                      </p:to>
+                                    </p:set>
+                                  </p:childTnLst>
+                                </p:cTn>
+                              </p:par>
+                            </p:childTnLst>
+                          </p:cTn>
+                        </p:par>
+                      </p:childTnLst>
+                    </p:cTn>
+                  </p:par>
+                  <p:par>
+                    <p:cTn id="19" fill="hold">
+                      <p:stCondLst>
+                        <p:cond delay="indefinite"/>
+                      </p:stCondLst>
+                      <p:childTnLst>
+                        <p:par>
+                          <p:cTn id="20" fill="hold">
+                            <p:stCondLst>
+                              <p:cond delay="0"/>
+                            </p:stCondLst>
+                            <p:childTnLst>
+                              <p:par>
+                                <p:cTn id="21" presetID="1" presetClass="entr" presetSubtype="0" fill="hold" grpId="0" nodeType="clickEffect">
+                                  <p:stCondLst>
+                                    <p:cond delay="0"/>
+                                  </p:stCondLst>
+                                  <p:childTnLst>
+                                    <p:set>
+                                      <p:cBhvr>
+                                        <p:cTn id="22" dur="1" fill="hold">
+                                          <p:stCondLst>
+                                            <p:cond delay="0"/>
+                                          </p:stCondLst>
+                                        </p:cTn>
+                                        <p:tgtEl>
+                                          <p:spTgt spid="20"/>
+                                        </p:tgtEl>
+                                        <p:attrNameLst>
+                                          <p:attrName>style.visibility</p:attrName>
+                                        </p:attrNameLst>
+                                      </p:cBhvr>
+                                      <p:to>
+                                        <p:strVal val="visible"/>
+                                      </p:to>
+                                    </p:set>
+                                  </p:childTnLst>
+                                </p:cTn>
+                              </p:par>
+                              <p:par>
+                                <p:cTn id="23" presetID="1" presetClass="entr" presetSubtype="0" fill="hold" grpId="0" nodeType="withEffect">
+                                  <p:stCondLst>
+                                    <p:cond delay="0"/>
+                                  </p:stCondLst>
+                                  <p:childTnLst>
+                                    <p:set>
+                                      <p:cBhvr>
+                                        <p:cTn id="24" dur="1" fill="hold">
+                                          <p:stCondLst>
+                                            <p:cond delay="0"/>
+                                          </p:stCondLst>
+                                        </p:cTn>
+                                        <p:tgtEl>
+                                          <p:spTgt spid="19"/>
+                                        </p:tgtEl>
+                                        <p:attrNameLst>
+                                          <p:attrName>style.visibility</p:attrName>
+                                        </p:attrNameLst>
+                                      </p:cBhvr>
+                                      <p:to>
+                                        <p:strVal val="visible"/>
+                                      </p:to>
+                                    </p:set>
+                                  </p:childTnLst>
+                                </p:cTn>
+                              </p:par>
+                              <p:par>
+                                <p:cTn id="25" presetID="1" presetClass="entr" presetSubtype="0" fill="hold" grpId="0" nodeType="withEffect">
+                                  <p:stCondLst>
+                                    <p:cond delay="0"/>
+                                  </p:stCondLst>
+                                  <p:childTnLst>
+                                    <p:set>
+                                      <p:cBhvr>
+                                        <p:cTn id="26" dur="1" fill="hold">
+                                          <p:stCondLst>
+                                            <p:cond delay="0"/>
+                                          </p:stCondLst>
+                                        </p:cTn>
+                                        <p:tgtEl>
+                                          <p:spTgt spid="22"/>
+                                        </p:tgtEl>
+                                        <p:attrNameLst>
+                                          <p:attrName>style.visibility</p:attrName>
+                                        </p:attrNameLst>
+                                      </p:cBhvr>
+                                      <p:to>
+                                        <p:strVal val="visible"/>
+                                      </p:to>
+                                    </p:set>
+                                  </p:childTnLst>
+                                </p:cTn>
+                              </p:par>
+                            </p:childTnLst>
+                          </p:cTn>
+                        </p:par>
+                      </p:childTnLst>
+                    </p:cTn>
+                  </p:par>
+                  <p:par>
+                    <p:cTn id="27" fill="hold">
+                      <p:stCondLst>
+                        <p:cond delay="indefinite"/>
+                      </p:stCondLst>
+                      <p:childTnLst>
+                        <p:par>
+                          <p:cTn id="28" fill="hold">
+                            <p:stCondLst>
+                              <p:cond delay="0"/>
+                            </p:stCondLst>
+                            <p:childTnLst>
+                              <p:par>
+                                <p:cTn id="29" presetID="1" presetClass="entr" presetSubtype="0" fill="hold" grpId="0" nodeType="clickEffect">
+                                  <p:stCondLst>
+                                    <p:cond delay="0"/>
+                                  </p:stCondLst>
+                                  <p:childTnLst>
+                                    <p:set>
+                                      <p:cBhvr>
+                                        <p:cTn id="30" dur="1" fill="hold">
+                                          <p:stCondLst>
+                                            <p:cond delay="0"/>
+                                          </p:stCondLst>
+                                        </p:cTn>
+                                        <p:tgtEl>
+                                          <p:spTgt spid="21"/>
+                                        </p:tgtEl>
+                                        <p:attrNameLst>
+                                          <p:attrName>style.visibility</p:attrName>
+                                        </p:attrNameLst>
+                                      </p:cBhvr>
+                                      <p:to>
+                                        <p:strVal val="visible"/>
+                                      </p:to>
+                                    </p:set>
+                                  </p:childTnLst>
+                                </p:cTn>
+                              </p:par>
+                            </p:childTnLst>
+                          </p:cTn>
+                        </p:par>
+                      </p:childTnLst>
+                    </p:cTn>
+                  </p:par>
+                  <p:par>
+                    <p:cTn id="31" fill="hold">
+                      <p:stCondLst>
+                        <p:cond delay="indefinite"/>
+                      </p:stCondLst>
+                      <p:childTnLst>
+                        <p:par>
+                          <p:cTn id="32" fill="hold">
+                            <p:stCondLst>
+                              <p:cond delay="0"/>
+                            </p:stCondLst>
+                            <p:childTnLst>
+                              <p:par>
+                                <p:cTn id="33" presetID="1" presetClass="entr" presetSubtype="0" fill="hold" grpId="0" nodeType="clickEffect">
+                                  <p:stCondLst>
+                                    <p:cond delay="0"/>
+                                  </p:stCondLst>
+                                  <p:childTnLst>
+                                    <p:set>
+                                      <p:cBhvr>
+                                        <p:cTn id="34" dur="1" fill="hold">
+                                          <p:stCondLst>
+                                            <p:cond delay="0"/>
+                                          </p:stCondLst>
+                                        </p:cTn>
+                                        <p:tgtEl>
+                                          <p:spTgt spid="23"/>
+                                        </p:tgtEl>
+                                        <p:attrNameLst>
+                                          <p:attrName>style.visibility</p:attrName>
+                                        </p:attrNameLst>
+                                      </p:cBhvr>
+                                      <p:to>
+                                        <p:strVal val="visible"/>
+                                      </p:to>
+                                    </p:set>
+                                  </p:childTnLst>
+                                </p:cTn>
+                              </p:par>
+                            </p:childTnLst>
+                          </p:cTn>
+                        </p:par>
+                      </p:childTnLst>
+                    </p:cTn>
+                  </p:par>
+                </p:childTnLst>
+              </p:cTn>
+              <p:prevCondLst>
+                <p:cond evt="onPrev" delay="0">
+                  <p:tgtEl>
+                    <p:sldTgt/>
+                  </p:tgtEl>
+                </p:cond>
+              </p:prevCondLst>
+              <p:nextCondLst>
+                <p:cond evt="onNext" delay="0">
+                  <p:tgtEl>
+                    <p:sldTgt/>
+                  </p:tgtEl>
+                </p:cond>
+              </p:nextCondLst>
+            </p:seq>
+          </p:childTnLst>
+        </p:cTn>
+      </p:par>
+    </p:tnLst>
+    <p:bldLst>
+      <p:bldP spid="9" grpId="0"/>
+      <p:bldP spid="10" grpId="0"/>
+      <p:bldP spid="11" grpId="0"/>
+      <p:bldP spid="12" grpId="0"/>
+      <p:bldP spid="13" grpId="0"/>
+      <p:bldP spid="19" grpId="0"/>
+      <p:bldP spid="20" grpId="0"/>
+      <p:bldP spid="21" grpId="0"/>
+      <p:bldP spid="22" grpId="0"/>
+      <p:bldP spid="23" grpId="0"/>
+    </p:bldLst>
+  </p:timing>
 </p:sld>
 </file>
 
@@ -4495,6 +5191,36 @@
           </a:p>
         </p:txBody>
       </p:sp>
+      <p:sp>
+        <p:nvSpPr>
+          <p:cNvPr id="29" name="TextBox 28"/>
+          <p:cNvSpPr txBox="1"/>
+          <p:nvPr/>
+        </p:nvSpPr>
+        <p:spPr>
+          <a:xfrm>
+            <a:off x="1896303" y="2139293"/>
+            <a:ext cx="355987" cy="276999"/>
+          </a:xfrm>
+          <a:prstGeom prst="rect">
+            <a:avLst/>
+          </a:prstGeom>
+          <a:noFill/>
+        </p:spPr>
+        <p:txBody>
+          <a:bodyPr wrap="none" rtlCol="0">
+            <a:spAutoFit/>
+          </a:bodyPr>
+          <a:lstStyle/>
+          <a:p>
+            <a:r>
+              <a:rPr lang="en-US" sz="1200" dirty="0" smtClean="0"/>
+              <a:t>(1)</a:t>
+            </a:r>
+            <a:endParaRPr lang="en-US" sz="1100" dirty="0" smtClean="0"/>
+          </a:p>
+        </p:txBody>
+      </p:sp>
     </p:spTree>
     <p:extLst>
       <p:ext uri="{BB962C8B-B14F-4D97-AF65-F5344CB8AC3E}">
@@ -4505,6 +5231,472 @@
   <p:clrMapOvr>
     <a:masterClrMapping/>
   </p:clrMapOvr>
+  <p:timing>
+    <p:tnLst>
+      <p:par>
+        <p:cTn xmlns:p14="http://schemas.microsoft.com/office/powerpoint/2010/main" id="1" dur="indefinite" restart="never" nodeType="tmRoot">
+          <p:childTnLst>
+            <p:seq concurrent="1" nextAc="seek">
+              <p:cTn id="2" dur="indefinite" nodeType="mainSeq">
+                <p:childTnLst>
+                  <p:par>
+                    <p:cTn id="3" fill="hold">
+                      <p:stCondLst>
+                        <p:cond delay="indefinite"/>
+                      </p:stCondLst>
+                      <p:childTnLst>
+                        <p:par>
+                          <p:cTn id="4" fill="hold">
+                            <p:stCondLst>
+                              <p:cond delay="0"/>
+                            </p:stCondLst>
+                            <p:childTnLst>
+                              <p:par>
+                                <p:cTn id="5" presetID="1" presetClass="entr" presetSubtype="0" fill="hold" grpId="0" nodeType="clickEffect">
+                                  <p:stCondLst>
+                                    <p:cond delay="0"/>
+                                  </p:stCondLst>
+                                  <p:childTnLst>
+                                    <p:set>
+                                      <p:cBhvr>
+                                        <p:cTn id="6" dur="1" fill="hold">
+                                          <p:stCondLst>
+                                            <p:cond delay="0"/>
+                                          </p:stCondLst>
+                                        </p:cTn>
+                                        <p:tgtEl>
+                                          <p:spTgt spid="19"/>
+                                        </p:tgtEl>
+                                        <p:attrNameLst>
+                                          <p:attrName>style.visibility</p:attrName>
+                                        </p:attrNameLst>
+                                      </p:cBhvr>
+                                      <p:to>
+                                        <p:strVal val="visible"/>
+                                      </p:to>
+                                    </p:set>
+                                  </p:childTnLst>
+                                </p:cTn>
+                              </p:par>
+                              <p:par>
+                                <p:cTn id="7" presetID="1" presetClass="entr" presetSubtype="0" fill="hold" grpId="0" nodeType="withEffect">
+                                  <p:stCondLst>
+                                    <p:cond delay="0"/>
+                                  </p:stCondLst>
+                                  <p:childTnLst>
+                                    <p:set>
+                                      <p:cBhvr>
+                                        <p:cTn id="8" dur="1" fill="hold">
+                                          <p:stCondLst>
+                                            <p:cond delay="0"/>
+                                          </p:stCondLst>
+                                        </p:cTn>
+                                        <p:tgtEl>
+                                          <p:spTgt spid="20"/>
+                                        </p:tgtEl>
+                                        <p:attrNameLst>
+                                          <p:attrName>style.visibility</p:attrName>
+                                        </p:attrNameLst>
+                                      </p:cBhvr>
+                                      <p:to>
+                                        <p:strVal val="visible"/>
+                                      </p:to>
+                                    </p:set>
+                                  </p:childTnLst>
+                                </p:cTn>
+                              </p:par>
+                              <p:par>
+                                <p:cTn id="9" presetID="1" presetClass="entr" presetSubtype="0" fill="hold" grpId="0" nodeType="withEffect">
+                                  <p:stCondLst>
+                                    <p:cond delay="0"/>
+                                  </p:stCondLst>
+                                  <p:childTnLst>
+                                    <p:set>
+                                      <p:cBhvr>
+                                        <p:cTn id="10" dur="1" fill="hold">
+                                          <p:stCondLst>
+                                            <p:cond delay="0"/>
+                                          </p:stCondLst>
+                                        </p:cTn>
+                                        <p:tgtEl>
+                                          <p:spTgt spid="22"/>
+                                        </p:tgtEl>
+                                        <p:attrNameLst>
+                                          <p:attrName>style.visibility</p:attrName>
+                                        </p:attrNameLst>
+                                      </p:cBhvr>
+                                      <p:to>
+                                        <p:strVal val="visible"/>
+                                      </p:to>
+                                    </p:set>
+                                  </p:childTnLst>
+                                </p:cTn>
+                              </p:par>
+                            </p:childTnLst>
+                          </p:cTn>
+                        </p:par>
+                      </p:childTnLst>
+                    </p:cTn>
+                  </p:par>
+                  <p:par>
+                    <p:cTn id="11" fill="hold">
+                      <p:stCondLst>
+                        <p:cond delay="indefinite"/>
+                      </p:stCondLst>
+                      <p:childTnLst>
+                        <p:par>
+                          <p:cTn id="12" fill="hold">
+                            <p:stCondLst>
+                              <p:cond delay="0"/>
+                            </p:stCondLst>
+                            <p:childTnLst>
+                              <p:par>
+                                <p:cTn id="13" presetID="1" presetClass="entr" presetSubtype="0" fill="hold" grpId="0" nodeType="clickEffect">
+                                  <p:stCondLst>
+                                    <p:cond delay="0"/>
+                                  </p:stCondLst>
+                                  <p:childTnLst>
+                                    <p:set>
+                                      <p:cBhvr>
+                                        <p:cTn id="14" dur="1" fill="hold">
+                                          <p:stCondLst>
+                                            <p:cond delay="0"/>
+                                          </p:stCondLst>
+                                        </p:cTn>
+                                        <p:tgtEl>
+                                          <p:spTgt spid="21"/>
+                                        </p:tgtEl>
+                                        <p:attrNameLst>
+                                          <p:attrName>style.visibility</p:attrName>
+                                        </p:attrNameLst>
+                                      </p:cBhvr>
+                                      <p:to>
+                                        <p:strVal val="visible"/>
+                                      </p:to>
+                                    </p:set>
+                                  </p:childTnLst>
+                                </p:cTn>
+                              </p:par>
+                            </p:childTnLst>
+                          </p:cTn>
+                        </p:par>
+                      </p:childTnLst>
+                    </p:cTn>
+                  </p:par>
+                  <p:par>
+                    <p:cTn id="15" fill="hold">
+                      <p:stCondLst>
+                        <p:cond delay="indefinite"/>
+                      </p:stCondLst>
+                      <p:childTnLst>
+                        <p:par>
+                          <p:cTn id="16" fill="hold">
+                            <p:stCondLst>
+                              <p:cond delay="0"/>
+                            </p:stCondLst>
+                            <p:childTnLst>
+                              <p:par>
+                                <p:cTn id="17" presetID="1" presetClass="entr" presetSubtype="0" fill="hold" grpId="0" nodeType="clickEffect">
+                                  <p:stCondLst>
+                                    <p:cond delay="0"/>
+                                  </p:stCondLst>
+                                  <p:childTnLst>
+                                    <p:set>
+                                      <p:cBhvr>
+                                        <p:cTn id="18" dur="1" fill="hold">
+                                          <p:stCondLst>
+                                            <p:cond delay="0"/>
+                                          </p:stCondLst>
+                                        </p:cTn>
+                                        <p:tgtEl>
+                                          <p:spTgt spid="23"/>
+                                        </p:tgtEl>
+                                        <p:attrNameLst>
+                                          <p:attrName>style.visibility</p:attrName>
+                                        </p:attrNameLst>
+                                      </p:cBhvr>
+                                      <p:to>
+                                        <p:strVal val="visible"/>
+                                      </p:to>
+                                    </p:set>
+                                  </p:childTnLst>
+                                </p:cTn>
+                              </p:par>
+                            </p:childTnLst>
+                          </p:cTn>
+                        </p:par>
+                      </p:childTnLst>
+                    </p:cTn>
+                  </p:par>
+                  <p:par>
+                    <p:cTn id="19" fill="hold">
+                      <p:stCondLst>
+                        <p:cond delay="indefinite"/>
+                      </p:stCondLst>
+                      <p:childTnLst>
+                        <p:par>
+                          <p:cTn id="20" fill="hold">
+                            <p:stCondLst>
+                              <p:cond delay="0"/>
+                            </p:stCondLst>
+                            <p:childTnLst>
+                              <p:par>
+                                <p:cTn id="21" presetID="1" presetClass="entr" presetSubtype="0" fill="hold" grpId="0" nodeType="clickEffect">
+                                  <p:stCondLst>
+                                    <p:cond delay="0"/>
+                                  </p:stCondLst>
+                                  <p:childTnLst>
+                                    <p:set>
+                                      <p:cBhvr>
+                                        <p:cTn id="22" dur="1" fill="hold">
+                                          <p:stCondLst>
+                                            <p:cond delay="0"/>
+                                          </p:stCondLst>
+                                        </p:cTn>
+                                        <p:tgtEl>
+                                          <p:spTgt spid="29"/>
+                                        </p:tgtEl>
+                                        <p:attrNameLst>
+                                          <p:attrName>style.visibility</p:attrName>
+                                        </p:attrNameLst>
+                                      </p:cBhvr>
+                                      <p:to>
+                                        <p:strVal val="visible"/>
+                                      </p:to>
+                                    </p:set>
+                                  </p:childTnLst>
+                                </p:cTn>
+                              </p:par>
+                            </p:childTnLst>
+                          </p:cTn>
+                        </p:par>
+                      </p:childTnLst>
+                    </p:cTn>
+                  </p:par>
+                  <p:par>
+                    <p:cTn id="23" fill="hold">
+                      <p:stCondLst>
+                        <p:cond delay="indefinite"/>
+                      </p:stCondLst>
+                      <p:childTnLst>
+                        <p:par>
+                          <p:cTn id="24" fill="hold">
+                            <p:stCondLst>
+                              <p:cond delay="0"/>
+                            </p:stCondLst>
+                            <p:childTnLst>
+                              <p:par>
+                                <p:cTn id="25" presetID="1" presetClass="entr" presetSubtype="0" fill="hold" grpId="0" nodeType="clickEffect">
+                                  <p:stCondLst>
+                                    <p:cond delay="0"/>
+                                  </p:stCondLst>
+                                  <p:childTnLst>
+                                    <p:set>
+                                      <p:cBhvr>
+                                        <p:cTn id="26" dur="1" fill="hold">
+                                          <p:stCondLst>
+                                            <p:cond delay="0"/>
+                                          </p:stCondLst>
+                                        </p:cTn>
+                                        <p:tgtEl>
+                                          <p:spTgt spid="24"/>
+                                        </p:tgtEl>
+                                        <p:attrNameLst>
+                                          <p:attrName>style.visibility</p:attrName>
+                                        </p:attrNameLst>
+                                      </p:cBhvr>
+                                      <p:to>
+                                        <p:strVal val="visible"/>
+                                      </p:to>
+                                    </p:set>
+                                  </p:childTnLst>
+                                </p:cTn>
+                              </p:par>
+                              <p:par>
+                                <p:cTn id="27" presetID="1" presetClass="entr" presetSubtype="0" fill="hold" grpId="0" nodeType="withEffect">
+                                  <p:stCondLst>
+                                    <p:cond delay="0"/>
+                                  </p:stCondLst>
+                                  <p:childTnLst>
+                                    <p:set>
+                                      <p:cBhvr>
+                                        <p:cTn id="28" dur="1" fill="hold">
+                                          <p:stCondLst>
+                                            <p:cond delay="0"/>
+                                          </p:stCondLst>
+                                        </p:cTn>
+                                        <p:tgtEl>
+                                          <p:spTgt spid="25"/>
+                                        </p:tgtEl>
+                                        <p:attrNameLst>
+                                          <p:attrName>style.visibility</p:attrName>
+                                        </p:attrNameLst>
+                                      </p:cBhvr>
+                                      <p:to>
+                                        <p:strVal val="visible"/>
+                                      </p:to>
+                                    </p:set>
+                                  </p:childTnLst>
+                                </p:cTn>
+                              </p:par>
+                              <p:par>
+                                <p:cTn id="29" presetID="1" presetClass="entr" presetSubtype="0" fill="hold" grpId="0" nodeType="withEffect">
+                                  <p:stCondLst>
+                                    <p:cond delay="0"/>
+                                  </p:stCondLst>
+                                  <p:childTnLst>
+                                    <p:set>
+                                      <p:cBhvr>
+                                        <p:cTn id="30" dur="1" fill="hold">
+                                          <p:stCondLst>
+                                            <p:cond delay="0"/>
+                                          </p:stCondLst>
+                                        </p:cTn>
+                                        <p:tgtEl>
+                                          <p:spTgt spid="27"/>
+                                        </p:tgtEl>
+                                        <p:attrNameLst>
+                                          <p:attrName>style.visibility</p:attrName>
+                                        </p:attrNameLst>
+                                      </p:cBhvr>
+                                      <p:to>
+                                        <p:strVal val="visible"/>
+                                      </p:to>
+                                    </p:set>
+                                  </p:childTnLst>
+                                </p:cTn>
+                              </p:par>
+                            </p:childTnLst>
+                          </p:cTn>
+                        </p:par>
+                      </p:childTnLst>
+                    </p:cTn>
+                  </p:par>
+                  <p:par>
+                    <p:cTn id="31" fill="hold">
+                      <p:stCondLst>
+                        <p:cond delay="indefinite"/>
+                      </p:stCondLst>
+                      <p:childTnLst>
+                        <p:par>
+                          <p:cTn id="32" fill="hold">
+                            <p:stCondLst>
+                              <p:cond delay="0"/>
+                            </p:stCondLst>
+                            <p:childTnLst>
+                              <p:par>
+                                <p:cTn id="33" presetID="1" presetClass="entr" presetSubtype="0" fill="hold" grpId="0" nodeType="clickEffect">
+                                  <p:stCondLst>
+                                    <p:cond delay="0"/>
+                                  </p:stCondLst>
+                                  <p:childTnLst>
+                                    <p:set>
+                                      <p:cBhvr>
+                                        <p:cTn id="34" dur="1" fill="hold">
+                                          <p:stCondLst>
+                                            <p:cond delay="0"/>
+                                          </p:stCondLst>
+                                        </p:cTn>
+                                        <p:tgtEl>
+                                          <p:spTgt spid="26"/>
+                                        </p:tgtEl>
+                                        <p:attrNameLst>
+                                          <p:attrName>style.visibility</p:attrName>
+                                        </p:attrNameLst>
+                                      </p:cBhvr>
+                                      <p:to>
+                                        <p:strVal val="visible"/>
+                                      </p:to>
+                                    </p:set>
+                                  </p:childTnLst>
+                                </p:cTn>
+                              </p:par>
+                            </p:childTnLst>
+                          </p:cTn>
+                        </p:par>
+                      </p:childTnLst>
+                    </p:cTn>
+                  </p:par>
+                  <p:par>
+                    <p:cTn id="35" fill="hold">
+                      <p:stCondLst>
+                        <p:cond delay="indefinite"/>
+                      </p:stCondLst>
+                      <p:childTnLst>
+                        <p:par>
+                          <p:cTn id="36" fill="hold">
+                            <p:stCondLst>
+                              <p:cond delay="0"/>
+                            </p:stCondLst>
+                            <p:childTnLst>
+                              <p:par>
+                                <p:cTn id="37" presetID="1" presetClass="entr" presetSubtype="0" fill="hold" grpId="0" nodeType="clickEffect">
+                                  <p:stCondLst>
+                                    <p:cond delay="0"/>
+                                  </p:stCondLst>
+                                  <p:childTnLst>
+                                    <p:set>
+                                      <p:cBhvr>
+                                        <p:cTn id="38" dur="1" fill="hold">
+                                          <p:stCondLst>
+                                            <p:cond delay="0"/>
+                                          </p:stCondLst>
+                                        </p:cTn>
+                                        <p:tgtEl>
+                                          <p:spTgt spid="28"/>
+                                        </p:tgtEl>
+                                        <p:attrNameLst>
+                                          <p:attrName>style.visibility</p:attrName>
+                                        </p:attrNameLst>
+                                      </p:cBhvr>
+                                      <p:to>
+                                        <p:strVal val="visible"/>
+                                      </p:to>
+                                    </p:set>
+                                  </p:childTnLst>
+                                </p:cTn>
+                              </p:par>
+                            </p:childTnLst>
+                          </p:cTn>
+                        </p:par>
+                      </p:childTnLst>
+                    </p:cTn>
+                  </p:par>
+                </p:childTnLst>
+              </p:cTn>
+              <p:prevCondLst>
+                <p:cond evt="onPrev" delay="0">
+                  <p:tgtEl>
+                    <p:sldTgt/>
+                  </p:tgtEl>
+                </p:cond>
+              </p:prevCondLst>
+              <p:nextCondLst>
+                <p:cond evt="onNext" delay="0">
+                  <p:tgtEl>
+                    <p:sldTgt/>
+                  </p:tgtEl>
+                </p:cond>
+              </p:nextCondLst>
+            </p:seq>
+          </p:childTnLst>
+        </p:cTn>
+      </p:par>
+    </p:tnLst>
+    <p:bldLst>
+      <p:bldP spid="19" grpId="0"/>
+      <p:bldP spid="20" grpId="0"/>
+      <p:bldP spid="21" grpId="0"/>
+      <p:bldP spid="22" grpId="0"/>
+      <p:bldP spid="23" grpId="0"/>
+      <p:bldP spid="24" grpId="0"/>
+      <p:bldP spid="25" grpId="0"/>
+      <p:bldP spid="26" grpId="0"/>
+      <p:bldP spid="27" grpId="0"/>
+      <p:bldP spid="28" grpId="0"/>
+      <p:bldP spid="29" grpId="0"/>
+    </p:bldLst>
+  </p:timing>
 </p:sld>
 </file>
 
@@ -5085,6 +6277,278 @@
   <p:clrMapOvr>
     <a:masterClrMapping/>
   </p:clrMapOvr>
+  <p:timing>
+    <p:tnLst>
+      <p:par>
+        <p:cTn xmlns:p14="http://schemas.microsoft.com/office/powerpoint/2010/main" id="1" dur="indefinite" restart="never" nodeType="tmRoot">
+          <p:childTnLst>
+            <p:seq concurrent="1" nextAc="seek">
+              <p:cTn id="2" dur="indefinite" nodeType="mainSeq">
+                <p:childTnLst>
+                  <p:par>
+                    <p:cTn id="3" fill="hold">
+                      <p:stCondLst>
+                        <p:cond delay="indefinite"/>
+                      </p:stCondLst>
+                      <p:childTnLst>
+                        <p:par>
+                          <p:cTn id="4" fill="hold">
+                            <p:stCondLst>
+                              <p:cond delay="0"/>
+                            </p:stCondLst>
+                            <p:childTnLst>
+                              <p:par>
+                                <p:cTn id="5" presetID="1" presetClass="entr" presetSubtype="0" fill="hold" grpId="0" nodeType="clickEffect">
+                                  <p:stCondLst>
+                                    <p:cond delay="0"/>
+                                  </p:stCondLst>
+                                  <p:childTnLst>
+                                    <p:set>
+                                      <p:cBhvr>
+                                        <p:cTn id="6" dur="1" fill="hold">
+                                          <p:stCondLst>
+                                            <p:cond delay="0"/>
+                                          </p:stCondLst>
+                                        </p:cTn>
+                                        <p:tgtEl>
+                                          <p:spTgt spid="22"/>
+                                        </p:tgtEl>
+                                        <p:attrNameLst>
+                                          <p:attrName>style.visibility</p:attrName>
+                                        </p:attrNameLst>
+                                      </p:cBhvr>
+                                      <p:to>
+                                        <p:strVal val="visible"/>
+                                      </p:to>
+                                    </p:set>
+                                  </p:childTnLst>
+                                </p:cTn>
+                              </p:par>
+                              <p:par>
+                                <p:cTn id="7" presetID="1" presetClass="entr" presetSubtype="0" fill="hold" grpId="0" nodeType="withEffect">
+                                  <p:stCondLst>
+                                    <p:cond delay="0"/>
+                                  </p:stCondLst>
+                                  <p:childTnLst>
+                                    <p:set>
+                                      <p:cBhvr>
+                                        <p:cTn id="8" dur="1" fill="hold">
+                                          <p:stCondLst>
+                                            <p:cond delay="0"/>
+                                          </p:stCondLst>
+                                        </p:cTn>
+                                        <p:tgtEl>
+                                          <p:spTgt spid="23"/>
+                                        </p:tgtEl>
+                                        <p:attrNameLst>
+                                          <p:attrName>style.visibility</p:attrName>
+                                        </p:attrNameLst>
+                                      </p:cBhvr>
+                                      <p:to>
+                                        <p:strVal val="visible"/>
+                                      </p:to>
+                                    </p:set>
+                                  </p:childTnLst>
+                                </p:cTn>
+                              </p:par>
+                            </p:childTnLst>
+                          </p:cTn>
+                        </p:par>
+                      </p:childTnLst>
+                    </p:cTn>
+                  </p:par>
+                  <p:par>
+                    <p:cTn id="9" fill="hold">
+                      <p:stCondLst>
+                        <p:cond delay="indefinite"/>
+                      </p:stCondLst>
+                      <p:childTnLst>
+                        <p:par>
+                          <p:cTn id="10" fill="hold">
+                            <p:stCondLst>
+                              <p:cond delay="0"/>
+                            </p:stCondLst>
+                            <p:childTnLst>
+                              <p:par>
+                                <p:cTn id="11" presetID="1" presetClass="entr" presetSubtype="0" fill="hold" grpId="0" nodeType="clickEffect">
+                                  <p:stCondLst>
+                                    <p:cond delay="0"/>
+                                  </p:stCondLst>
+                                  <p:childTnLst>
+                                    <p:set>
+                                      <p:cBhvr>
+                                        <p:cTn id="12" dur="1" fill="hold">
+                                          <p:stCondLst>
+                                            <p:cond delay="0"/>
+                                          </p:stCondLst>
+                                        </p:cTn>
+                                        <p:tgtEl>
+                                          <p:spTgt spid="24"/>
+                                        </p:tgtEl>
+                                        <p:attrNameLst>
+                                          <p:attrName>style.visibility</p:attrName>
+                                        </p:attrNameLst>
+                                      </p:cBhvr>
+                                      <p:to>
+                                        <p:strVal val="visible"/>
+                                      </p:to>
+                                    </p:set>
+                                  </p:childTnLst>
+                                </p:cTn>
+                              </p:par>
+                            </p:childTnLst>
+                          </p:cTn>
+                        </p:par>
+                      </p:childTnLst>
+                    </p:cTn>
+                  </p:par>
+                  <p:par>
+                    <p:cTn id="13" fill="hold">
+                      <p:stCondLst>
+                        <p:cond delay="indefinite"/>
+                      </p:stCondLst>
+                      <p:childTnLst>
+                        <p:par>
+                          <p:cTn id="14" fill="hold">
+                            <p:stCondLst>
+                              <p:cond delay="0"/>
+                            </p:stCondLst>
+                            <p:childTnLst>
+                              <p:par>
+                                <p:cTn id="15" presetID="1" presetClass="entr" presetSubtype="0" fill="hold" grpId="0" nodeType="clickEffect">
+                                  <p:stCondLst>
+                                    <p:cond delay="0"/>
+                                  </p:stCondLst>
+                                  <p:childTnLst>
+                                    <p:set>
+                                      <p:cBhvr>
+                                        <p:cTn id="16" dur="1" fill="hold">
+                                          <p:stCondLst>
+                                            <p:cond delay="0"/>
+                                          </p:stCondLst>
+                                        </p:cTn>
+                                        <p:tgtEl>
+                                          <p:spTgt spid="27"/>
+                                        </p:tgtEl>
+                                        <p:attrNameLst>
+                                          <p:attrName>style.visibility</p:attrName>
+                                        </p:attrNameLst>
+                                      </p:cBhvr>
+                                      <p:to>
+                                        <p:strVal val="visible"/>
+                                      </p:to>
+                                    </p:set>
+                                  </p:childTnLst>
+                                </p:cTn>
+                              </p:par>
+                              <p:par>
+                                <p:cTn id="17" presetID="1" presetClass="entr" presetSubtype="0" fill="hold" grpId="0" nodeType="withEffect">
+                                  <p:stCondLst>
+                                    <p:cond delay="0"/>
+                                  </p:stCondLst>
+                                  <p:childTnLst>
+                                    <p:set>
+                                      <p:cBhvr>
+                                        <p:cTn id="18" dur="1" fill="hold">
+                                          <p:stCondLst>
+                                            <p:cond delay="0"/>
+                                          </p:stCondLst>
+                                        </p:cTn>
+                                        <p:tgtEl>
+                                          <p:spTgt spid="28"/>
+                                        </p:tgtEl>
+                                        <p:attrNameLst>
+                                          <p:attrName>style.visibility</p:attrName>
+                                        </p:attrNameLst>
+                                      </p:cBhvr>
+                                      <p:to>
+                                        <p:strVal val="visible"/>
+                                      </p:to>
+                                    </p:set>
+                                  </p:childTnLst>
+                                </p:cTn>
+                              </p:par>
+                            </p:childTnLst>
+                          </p:cTn>
+                        </p:par>
+                      </p:childTnLst>
+                    </p:cTn>
+                  </p:par>
+                  <p:par>
+                    <p:cTn id="19" fill="hold">
+                      <p:stCondLst>
+                        <p:cond delay="indefinite"/>
+                      </p:stCondLst>
+                      <p:childTnLst>
+                        <p:par>
+                          <p:cTn id="20" fill="hold">
+                            <p:stCondLst>
+                              <p:cond delay="0"/>
+                            </p:stCondLst>
+                            <p:childTnLst>
+                              <p:par>
+                                <p:cTn id="21" presetID="1" presetClass="entr" presetSubtype="0" fill="hold" grpId="0" nodeType="clickEffect">
+                                  <p:stCondLst>
+                                    <p:cond delay="0"/>
+                                  </p:stCondLst>
+                                  <p:childTnLst>
+                                    <p:set>
+                                      <p:cBhvr>
+                                        <p:cTn id="22" dur="1" fill="hold">
+                                          <p:stCondLst>
+                                            <p:cond delay="0"/>
+                                          </p:stCondLst>
+                                        </p:cTn>
+                                        <p:tgtEl>
+                                          <p:spTgt spid="29"/>
+                                        </p:tgtEl>
+                                        <p:attrNameLst>
+                                          <p:attrName>style.visibility</p:attrName>
+                                        </p:attrNameLst>
+                                      </p:cBhvr>
+                                      <p:to>
+                                        <p:strVal val="visible"/>
+                                      </p:to>
+                                    </p:set>
+                                  </p:childTnLst>
+                                </p:cTn>
+                              </p:par>
+                            </p:childTnLst>
+                          </p:cTn>
+                        </p:par>
+                      </p:childTnLst>
+                    </p:cTn>
+                  </p:par>
+                </p:childTnLst>
+              </p:cTn>
+              <p:prevCondLst>
+                <p:cond evt="onPrev" delay="0">
+                  <p:tgtEl>
+                    <p:sldTgt/>
+                  </p:tgtEl>
+                </p:cond>
+              </p:prevCondLst>
+              <p:nextCondLst>
+                <p:cond evt="onNext" delay="0">
+                  <p:tgtEl>
+                    <p:sldTgt/>
+                  </p:tgtEl>
+                </p:cond>
+              </p:nextCondLst>
+            </p:seq>
+          </p:childTnLst>
+        </p:cTn>
+      </p:par>
+    </p:tnLst>
+    <p:bldLst>
+      <p:bldP spid="22" grpId="0"/>
+      <p:bldP spid="23" grpId="0"/>
+      <p:bldP spid="24" grpId="0"/>
+      <p:bldP spid="27" grpId="0"/>
+      <p:bldP spid="28" grpId="0"/>
+      <p:bldP spid="29" grpId="0"/>
+    </p:bldLst>
+  </p:timing>
 </p:sld>
 </file>
 
@@ -5447,6 +6911,130 @@
   <p:clrMapOvr>
     <a:masterClrMapping/>
   </p:clrMapOvr>
+  <p:timing>
+    <p:tnLst>
+      <p:par>
+        <p:cTn xmlns:p14="http://schemas.microsoft.com/office/powerpoint/2010/main" id="1" dur="indefinite" restart="never" nodeType="tmRoot">
+          <p:childTnLst>
+            <p:seq concurrent="1" nextAc="seek">
+              <p:cTn id="2" dur="indefinite" nodeType="mainSeq">
+                <p:childTnLst>
+                  <p:par>
+                    <p:cTn id="3" fill="hold">
+                      <p:stCondLst>
+                        <p:cond delay="indefinite"/>
+                      </p:stCondLst>
+                      <p:childTnLst>
+                        <p:par>
+                          <p:cTn id="4" fill="hold">
+                            <p:stCondLst>
+                              <p:cond delay="0"/>
+                            </p:stCondLst>
+                            <p:childTnLst>
+                              <p:par>
+                                <p:cTn id="5" presetID="1" presetClass="entr" presetSubtype="0" fill="hold" grpId="0" nodeType="clickEffect">
+                                  <p:stCondLst>
+                                    <p:cond delay="0"/>
+                                  </p:stCondLst>
+                                  <p:childTnLst>
+                                    <p:set>
+                                      <p:cBhvr>
+                                        <p:cTn id="6" dur="1" fill="hold">
+                                          <p:stCondLst>
+                                            <p:cond delay="0"/>
+                                          </p:stCondLst>
+                                        </p:cTn>
+                                        <p:tgtEl>
+                                          <p:spTgt spid="23"/>
+                                        </p:tgtEl>
+                                        <p:attrNameLst>
+                                          <p:attrName>style.visibility</p:attrName>
+                                        </p:attrNameLst>
+                                      </p:cBhvr>
+                                      <p:to>
+                                        <p:strVal val="visible"/>
+                                      </p:to>
+                                    </p:set>
+                                  </p:childTnLst>
+                                </p:cTn>
+                              </p:par>
+                            </p:childTnLst>
+                          </p:cTn>
+                        </p:par>
+                      </p:childTnLst>
+                    </p:cTn>
+                  </p:par>
+                  <p:par>
+                    <p:cTn id="7" fill="hold">
+                      <p:stCondLst>
+                        <p:cond delay="indefinite"/>
+                      </p:stCondLst>
+                      <p:childTnLst>
+                        <p:par>
+                          <p:cTn id="8" fill="hold">
+                            <p:stCondLst>
+                              <p:cond delay="0"/>
+                            </p:stCondLst>
+                            <p:childTnLst>
+                              <p:par>
+                                <p:cTn id="9" presetID="1" presetClass="entr" presetSubtype="0" fill="hold" grpId="0" nodeType="clickEffect">
+                                  <p:stCondLst>
+                                    <p:cond delay="0"/>
+                                  </p:stCondLst>
+                                  <p:childTnLst>
+                                    <p:set>
+                                      <p:cBhvr>
+                                        <p:cTn id="10" dur="1" fill="hold">
+                                          <p:stCondLst>
+                                            <p:cond delay="0"/>
+                                          </p:stCondLst>
+                                        </p:cTn>
+                                        <p:tgtEl>
+                                          <p:spTgt spid="28"/>
+                                        </p:tgtEl>
+                                        <p:attrNameLst>
+                                          <p:attrName>style.visibility</p:attrName>
+                                        </p:attrNameLst>
+                                      </p:cBhvr>
+                                      <p:to>
+                                        <p:strVal val="visible"/>
+                                      </p:to>
+                                    </p:set>
+                                  </p:childTnLst>
+                                </p:cTn>
+                              </p:par>
+                            </p:childTnLst>
+                          </p:cTn>
+                        </p:par>
+                      </p:childTnLst>
+                    </p:cTn>
+                  </p:par>
+                </p:childTnLst>
+              </p:cTn>
+              <p:prevCondLst>
+                <p:cond evt="onPrev" delay="0">
+                  <p:tgtEl>
+                    <p:sldTgt/>
+                  </p:tgtEl>
+                </p:cond>
+              </p:prevCondLst>
+              <p:nextCondLst>
+                <p:cond evt="onNext" delay="0">
+                  <p:tgtEl>
+                    <p:sldTgt/>
+                  </p:tgtEl>
+                </p:cond>
+              </p:nextCondLst>
+            </p:seq>
+          </p:childTnLst>
+        </p:cTn>
+      </p:par>
+    </p:tnLst>
+    <p:bldLst>
+      <p:bldP spid="23" grpId="0"/>
+      <p:bldP spid="28" grpId="0"/>
+    </p:bldLst>
+  </p:timing>
 </p:sld>
 </file>
 
@@ -5809,6 +7397,130 @@
   <p:clrMapOvr>
     <a:masterClrMapping/>
   </p:clrMapOvr>
+  <p:timing>
+    <p:tnLst>
+      <p:par>
+        <p:cTn xmlns:p14="http://schemas.microsoft.com/office/powerpoint/2010/main" id="1" dur="indefinite" restart="never" nodeType="tmRoot">
+          <p:childTnLst>
+            <p:seq concurrent="1" nextAc="seek">
+              <p:cTn id="2" dur="indefinite" nodeType="mainSeq">
+                <p:childTnLst>
+                  <p:par>
+                    <p:cTn id="3" fill="hold">
+                      <p:stCondLst>
+                        <p:cond delay="indefinite"/>
+                      </p:stCondLst>
+                      <p:childTnLst>
+                        <p:par>
+                          <p:cTn id="4" fill="hold">
+                            <p:stCondLst>
+                              <p:cond delay="0"/>
+                            </p:stCondLst>
+                            <p:childTnLst>
+                              <p:par>
+                                <p:cTn id="5" presetID="1" presetClass="entr" presetSubtype="0" fill="hold" grpId="0" nodeType="clickEffect">
+                                  <p:stCondLst>
+                                    <p:cond delay="0"/>
+                                  </p:stCondLst>
+                                  <p:childTnLst>
+                                    <p:set>
+                                      <p:cBhvr>
+                                        <p:cTn id="6" dur="1" fill="hold">
+                                          <p:stCondLst>
+                                            <p:cond delay="0"/>
+                                          </p:stCondLst>
+                                        </p:cTn>
+                                        <p:tgtEl>
+                                          <p:spTgt spid="23"/>
+                                        </p:tgtEl>
+                                        <p:attrNameLst>
+                                          <p:attrName>style.visibility</p:attrName>
+                                        </p:attrNameLst>
+                                      </p:cBhvr>
+                                      <p:to>
+                                        <p:strVal val="visible"/>
+                                      </p:to>
+                                    </p:set>
+                                  </p:childTnLst>
+                                </p:cTn>
+                              </p:par>
+                            </p:childTnLst>
+                          </p:cTn>
+                        </p:par>
+                      </p:childTnLst>
+                    </p:cTn>
+                  </p:par>
+                  <p:par>
+                    <p:cTn id="7" fill="hold">
+                      <p:stCondLst>
+                        <p:cond delay="indefinite"/>
+                      </p:stCondLst>
+                      <p:childTnLst>
+                        <p:par>
+                          <p:cTn id="8" fill="hold">
+                            <p:stCondLst>
+                              <p:cond delay="0"/>
+                            </p:stCondLst>
+                            <p:childTnLst>
+                              <p:par>
+                                <p:cTn id="9" presetID="1" presetClass="entr" presetSubtype="0" fill="hold" grpId="0" nodeType="clickEffect">
+                                  <p:stCondLst>
+                                    <p:cond delay="0"/>
+                                  </p:stCondLst>
+                                  <p:childTnLst>
+                                    <p:set>
+                                      <p:cBhvr>
+                                        <p:cTn id="10" dur="1" fill="hold">
+                                          <p:stCondLst>
+                                            <p:cond delay="0"/>
+                                          </p:stCondLst>
+                                        </p:cTn>
+                                        <p:tgtEl>
+                                          <p:spTgt spid="28"/>
+                                        </p:tgtEl>
+                                        <p:attrNameLst>
+                                          <p:attrName>style.visibility</p:attrName>
+                                        </p:attrNameLst>
+                                      </p:cBhvr>
+                                      <p:to>
+                                        <p:strVal val="visible"/>
+                                      </p:to>
+                                    </p:set>
+                                  </p:childTnLst>
+                                </p:cTn>
+                              </p:par>
+                            </p:childTnLst>
+                          </p:cTn>
+                        </p:par>
+                      </p:childTnLst>
+                    </p:cTn>
+                  </p:par>
+                </p:childTnLst>
+              </p:cTn>
+              <p:prevCondLst>
+                <p:cond evt="onPrev" delay="0">
+                  <p:tgtEl>
+                    <p:sldTgt/>
+                  </p:tgtEl>
+                </p:cond>
+              </p:prevCondLst>
+              <p:nextCondLst>
+                <p:cond evt="onNext" delay="0">
+                  <p:tgtEl>
+                    <p:sldTgt/>
+                  </p:tgtEl>
+                </p:cond>
+              </p:nextCondLst>
+            </p:seq>
+          </p:childTnLst>
+        </p:cTn>
+      </p:par>
+    </p:tnLst>
+    <p:bldLst>
+      <p:bldP spid="23" grpId="0"/>
+      <p:bldP spid="28" grpId="0"/>
+    </p:bldLst>
+  </p:timing>
 </p:sld>
 </file>
 

</xml_diff>